<commit_message>
update vandermonde example syntax
</commit_message>
<xml_diff>
--- a/julia/Julia-intro.pptx
+++ b/julia/Julia-intro.pptx
@@ -224,7 +224,7 @@
           <a:p>
             <a:fld id="{1F1F7F9C-49D3-454E-9B8D-9A9D1603A87C}" type="datetimeFigureOut">
               <a:rPr lang="en-US" smtClean="0"/>
-              <a:t>9/7/18</a:t>
+              <a:t>12/6/18</a:t>
             </a:fld>
             <a:endParaRPr lang="en-US"/>
           </a:p>
@@ -754,7 +754,7 @@
           <a:p>
             <a:fld id="{09D0395C-8A5B-CA45-A966-25AB2CC68A80}" type="datetimeFigureOut">
               <a:rPr lang="en-US" smtClean="0"/>
-              <a:t>9/7/18</a:t>
+              <a:t>12/6/18</a:t>
             </a:fld>
             <a:endParaRPr lang="en-US"/>
           </a:p>
@@ -922,7 +922,7 @@
           <a:p>
             <a:fld id="{09D0395C-8A5B-CA45-A966-25AB2CC68A80}" type="datetimeFigureOut">
               <a:rPr lang="en-US" smtClean="0"/>
-              <a:t>9/7/18</a:t>
+              <a:t>12/6/18</a:t>
             </a:fld>
             <a:endParaRPr lang="en-US"/>
           </a:p>
@@ -1100,7 +1100,7 @@
           <a:p>
             <a:fld id="{09D0395C-8A5B-CA45-A966-25AB2CC68A80}" type="datetimeFigureOut">
               <a:rPr lang="en-US" smtClean="0"/>
-              <a:t>9/7/18</a:t>
+              <a:t>12/6/18</a:t>
             </a:fld>
             <a:endParaRPr lang="en-US"/>
           </a:p>
@@ -1268,7 +1268,7 @@
           <a:p>
             <a:fld id="{09D0395C-8A5B-CA45-A966-25AB2CC68A80}" type="datetimeFigureOut">
               <a:rPr lang="en-US" smtClean="0"/>
-              <a:t>9/7/18</a:t>
+              <a:t>12/6/18</a:t>
             </a:fld>
             <a:endParaRPr lang="en-US"/>
           </a:p>
@@ -1513,7 +1513,7 @@
           <a:p>
             <a:fld id="{09D0395C-8A5B-CA45-A966-25AB2CC68A80}" type="datetimeFigureOut">
               <a:rPr lang="en-US" smtClean="0"/>
-              <a:t>9/7/18</a:t>
+              <a:t>12/6/18</a:t>
             </a:fld>
             <a:endParaRPr lang="en-US"/>
           </a:p>
@@ -1798,7 +1798,7 @@
           <a:p>
             <a:fld id="{09D0395C-8A5B-CA45-A966-25AB2CC68A80}" type="datetimeFigureOut">
               <a:rPr lang="en-US" smtClean="0"/>
-              <a:t>9/7/18</a:t>
+              <a:t>12/6/18</a:t>
             </a:fld>
             <a:endParaRPr lang="en-US"/>
           </a:p>
@@ -2217,7 +2217,7 @@
           <a:p>
             <a:fld id="{09D0395C-8A5B-CA45-A966-25AB2CC68A80}" type="datetimeFigureOut">
               <a:rPr lang="en-US" smtClean="0"/>
-              <a:t>9/7/18</a:t>
+              <a:t>12/6/18</a:t>
             </a:fld>
             <a:endParaRPr lang="en-US"/>
           </a:p>
@@ -2334,7 +2334,7 @@
           <a:p>
             <a:fld id="{09D0395C-8A5B-CA45-A966-25AB2CC68A80}" type="datetimeFigureOut">
               <a:rPr lang="en-US" smtClean="0"/>
-              <a:t>9/7/18</a:t>
+              <a:t>12/6/18</a:t>
             </a:fld>
             <a:endParaRPr lang="en-US"/>
           </a:p>
@@ -2429,7 +2429,7 @@
           <a:p>
             <a:fld id="{09D0395C-8A5B-CA45-A966-25AB2CC68A80}" type="datetimeFigureOut">
               <a:rPr lang="en-US" smtClean="0"/>
-              <a:t>9/7/18</a:t>
+              <a:t>12/6/18</a:t>
             </a:fld>
             <a:endParaRPr lang="en-US"/>
           </a:p>
@@ -2704,7 +2704,7 @@
           <a:p>
             <a:fld id="{09D0395C-8A5B-CA45-A966-25AB2CC68A80}" type="datetimeFigureOut">
               <a:rPr lang="en-US" smtClean="0"/>
-              <a:t>9/7/18</a:t>
+              <a:t>12/6/18</a:t>
             </a:fld>
             <a:endParaRPr lang="en-US"/>
           </a:p>
@@ -2956,7 +2956,7 @@
           <a:p>
             <a:fld id="{09D0395C-8A5B-CA45-A966-25AB2CC68A80}" type="datetimeFigureOut">
               <a:rPr lang="en-US" smtClean="0"/>
-              <a:t>9/7/18</a:t>
+              <a:t>12/6/18</a:t>
             </a:fld>
             <a:endParaRPr lang="en-US"/>
           </a:p>
@@ -3167,7 +3167,7 @@
           <a:p>
             <a:fld id="{09D0395C-8A5B-CA45-A966-25AB2CC68A80}" type="datetimeFigureOut">
               <a:rPr lang="en-US" smtClean="0"/>
-              <a:t>9/7/18</a:t>
+              <a:t>12/6/18</a:t>
             </a:fld>
             <a:endParaRPr lang="en-US"/>
           </a:p>
@@ -4015,39 +4015,39 @@
                 <a:latin typeface="Monaco"/>
                 <a:cs typeface="Monaco"/>
               </a:rPr>
-              <a:t>{T}(x::</a:t>
+              <a:t>(x, n=length(x))</a:t>
+            </a:r>
+          </a:p>
+          <a:p>
+            <a:r>
+              <a:rPr lang="en-US" sz="1600" dirty="0">
+                <a:latin typeface="Monaco"/>
+                <a:cs typeface="Monaco"/>
+              </a:rPr>
+              <a:t>    m = length(x)</a:t>
+            </a:r>
+          </a:p>
+          <a:p>
+            <a:r>
+              <a:rPr lang="en-US" sz="1600" dirty="0">
+                <a:latin typeface="Monaco"/>
+                <a:cs typeface="Monaco"/>
+              </a:rPr>
+              <a:t>    V = Array(</a:t>
             </a:r>
             <a:r>
               <a:rPr lang="en-US" sz="1600" dirty="0" err="1">
                 <a:latin typeface="Monaco"/>
                 <a:cs typeface="Monaco"/>
               </a:rPr>
-              <a:t>AbstractVector</a:t>
+              <a:t>eltype</a:t>
             </a:r>
             <a:r>
               <a:rPr lang="en-US" sz="1600" dirty="0">
                 <a:latin typeface="Monaco"/>
                 <a:cs typeface="Monaco"/>
               </a:rPr>
-              <a:t>{T}, n=length(x))</a:t>
-            </a:r>
-          </a:p>
-          <a:p>
-            <a:r>
-              <a:rPr lang="en-US" sz="1600" dirty="0">
-                <a:latin typeface="Monaco"/>
-                <a:cs typeface="Monaco"/>
-              </a:rPr>
-              <a:t>    m = length(x)</a:t>
-            </a:r>
-          </a:p>
-          <a:p>
-            <a:r>
-              <a:rPr lang="en-US" sz="1600" dirty="0">
-                <a:latin typeface="Monaco"/>
-                <a:cs typeface="Monaco"/>
-              </a:rPr>
-              <a:t>    V = Array(T, m, n)</a:t>
+              <a:t>(x), m, n)</a:t>
             </a:r>
           </a:p>
           <a:p>
@@ -4358,39 +4358,46 @@
                 <a:latin typeface="Monaco"/>
                 <a:cs typeface="Monaco"/>
               </a:rPr>
-              <a:t>{T}(x::</a:t>
+              <a:t>(x, n=length(x))</a:t>
+            </a:r>
+          </a:p>
+          <a:p>
+            <a:r>
+              <a:rPr lang="en-US" sz="1400" dirty="0">
+                <a:latin typeface="Monaco"/>
+                <a:cs typeface="Monaco"/>
+              </a:rPr>
+              <a:t>    m = length(x)</a:t>
+            </a:r>
+          </a:p>
+          <a:p>
+            <a:r>
+              <a:rPr lang="en-US" sz="1400" dirty="0">
+                <a:latin typeface="Monaco"/>
+                <a:cs typeface="Monaco"/>
+              </a:rPr>
+              <a:t>    V = Array(</a:t>
             </a:r>
             <a:r>
               <a:rPr lang="en-US" sz="1400" dirty="0" err="1">
                 <a:latin typeface="Monaco"/>
                 <a:cs typeface="Monaco"/>
               </a:rPr>
-              <a:t>AbstractVector</a:t>
+              <a:t>eltype</a:t>
+            </a:r>
+            <a:r>
+              <a:rPr lang="en-US" sz="1400">
+                <a:latin typeface="Monaco"/>
+                <a:cs typeface="Monaco"/>
+              </a:rPr>
+              <a:t>(x), </a:t>
             </a:r>
             <a:r>
               <a:rPr lang="en-US" sz="1400" dirty="0">
                 <a:latin typeface="Monaco"/>
                 <a:cs typeface="Monaco"/>
               </a:rPr>
-              <a:t>{T}, n=length(x))</a:t>
-            </a:r>
-          </a:p>
-          <a:p>
-            <a:r>
-              <a:rPr lang="en-US" sz="1400" dirty="0">
-                <a:latin typeface="Monaco"/>
-                <a:cs typeface="Monaco"/>
-              </a:rPr>
-              <a:t>    m = length(x)</a:t>
-            </a:r>
-          </a:p>
-          <a:p>
-            <a:r>
-              <a:rPr lang="en-US" sz="1400" dirty="0">
-                <a:latin typeface="Monaco"/>
-                <a:cs typeface="Monaco"/>
-              </a:rPr>
-              <a:t>    V = Array(T, m, n)</a:t>
+              <a:t>m, n)</a:t>
             </a:r>
           </a:p>
           <a:p>

</xml_diff>